<commit_message>
Phase 3: Update powerpoint slides
</commit_message>
<xml_diff>
--- a/Phase 3/CSE111-Phase 3.pptx
+++ b/Phase 3/CSE111-Phase 3.pptx
@@ -823,7 +823,7 @@
   <p:cSld>
     <p:spTree>
       <p:nvGrpSpPr>
-        <p:cNvPr id="584" name="Shape 584"/>
+        <p:cNvPr id="582" name="Shape 582"/>
         <p:cNvGrpSpPr/>
         <p:nvPr/>
       </p:nvGrpSpPr>
@@ -837,7 +837,7 @@
       </p:grpSpPr>
       <p:sp>
         <p:nvSpPr>
-          <p:cNvPr id="585" name="Google Shape;585;g2a2e91e1615_0_545:notes"/>
+          <p:cNvPr id="583" name="Google Shape;583;g2a2e91e1615_0_545:notes"/>
           <p:cNvSpPr/>
           <p:nvPr>
             <p:ph idx="2" type="sldImg"/>
@@ -872,7 +872,7 @@
       </p:sp>
       <p:sp>
         <p:nvSpPr>
-          <p:cNvPr id="586" name="Google Shape;586;g2a2e91e1615_0_545:notes"/>
+          <p:cNvPr id="584" name="Google Shape;584;g2a2e91e1615_0_545:notes"/>
           <p:cNvSpPr txBox="1"/>
           <p:nvPr>
             <p:ph idx="1" type="body"/>
@@ -1122,7 +1122,7 @@
   <p:cSld>
     <p:spTree>
       <p:nvGrpSpPr>
-        <p:cNvPr id="544" name="Shape 544"/>
+        <p:cNvPr id="542" name="Shape 542"/>
         <p:cNvGrpSpPr/>
         <p:nvPr/>
       </p:nvGrpSpPr>
@@ -1136,7 +1136,7 @@
       </p:grpSpPr>
       <p:sp>
         <p:nvSpPr>
-          <p:cNvPr id="545" name="Google Shape;545;g2a2e91e1615_0_529:notes"/>
+          <p:cNvPr id="543" name="Google Shape;543;g2a2e91e1615_0_529:notes"/>
           <p:cNvSpPr/>
           <p:nvPr>
             <p:ph idx="2" type="sldImg"/>
@@ -1171,7 +1171,7 @@
       </p:sp>
       <p:sp>
         <p:nvSpPr>
-          <p:cNvPr id="546" name="Google Shape;546;g2a2e91e1615_0_529:notes"/>
+          <p:cNvPr id="544" name="Google Shape;544;g2a2e91e1615_0_529:notes"/>
           <p:cNvSpPr txBox="1"/>
           <p:nvPr>
             <p:ph idx="1" type="body"/>
@@ -1325,7 +1325,7 @@
   <p:cSld>
     <p:spTree>
       <p:nvGrpSpPr>
-        <p:cNvPr id="550" name="Shape 550"/>
+        <p:cNvPr id="548" name="Shape 548"/>
         <p:cNvGrpSpPr/>
         <p:nvPr/>
       </p:nvGrpSpPr>
@@ -1339,7 +1339,7 @@
       </p:grpSpPr>
       <p:sp>
         <p:nvSpPr>
-          <p:cNvPr id="551" name="Google Shape;551;g2a2e91e1615_0_534:notes"/>
+          <p:cNvPr id="549" name="Google Shape;549;g2a2e91e1615_0_534:notes"/>
           <p:cNvSpPr/>
           <p:nvPr>
             <p:ph idx="2" type="sldImg"/>
@@ -1374,7 +1374,7 @@
       </p:sp>
       <p:sp>
         <p:nvSpPr>
-          <p:cNvPr id="552" name="Google Shape;552;g2a2e91e1615_0_534:notes"/>
+          <p:cNvPr id="550" name="Google Shape;550;g2a2e91e1615_0_534:notes"/>
           <p:cNvSpPr txBox="1"/>
           <p:nvPr>
             <p:ph idx="1" type="body"/>
@@ -1424,7 +1424,7 @@
   <p:cSld>
     <p:spTree>
       <p:nvGrpSpPr>
-        <p:cNvPr id="557" name="Shape 557"/>
+        <p:cNvPr id="555" name="Shape 555"/>
         <p:cNvGrpSpPr/>
         <p:nvPr/>
       </p:nvGrpSpPr>
@@ -1438,7 +1438,7 @@
       </p:grpSpPr>
       <p:sp>
         <p:nvSpPr>
-          <p:cNvPr id="558" name="Google Shape;558;g2a2e91e1615_0_540:notes"/>
+          <p:cNvPr id="556" name="Google Shape;556;g2a2e91e1615_0_540:notes"/>
           <p:cNvSpPr/>
           <p:nvPr>
             <p:ph idx="2" type="sldImg"/>
@@ -1473,7 +1473,7 @@
       </p:sp>
       <p:sp>
         <p:nvSpPr>
-          <p:cNvPr id="559" name="Google Shape;559;g2a2e91e1615_0_540:notes"/>
+          <p:cNvPr id="557" name="Google Shape;557;g2a2e91e1615_0_540:notes"/>
           <p:cNvSpPr txBox="1"/>
           <p:nvPr>
             <p:ph idx="1" type="body"/>
@@ -1524,7 +1524,7 @@
   <p:cSld>
     <p:spTree>
       <p:nvGrpSpPr>
-        <p:cNvPr id="563" name="Shape 563"/>
+        <p:cNvPr id="561" name="Shape 561"/>
         <p:cNvGrpSpPr/>
         <p:nvPr/>
       </p:nvGrpSpPr>
@@ -1538,7 +1538,7 @@
       </p:grpSpPr>
       <p:sp>
         <p:nvSpPr>
-          <p:cNvPr id="564" name="Google Shape;564;g263304eb28b_1_0:notes"/>
+          <p:cNvPr id="562" name="Google Shape;562;g263304eb28b_1_0:notes"/>
           <p:cNvSpPr/>
           <p:nvPr>
             <p:ph idx="2" type="sldImg"/>
@@ -1573,7 +1573,7 @@
       </p:sp>
       <p:sp>
         <p:nvSpPr>
-          <p:cNvPr id="565" name="Google Shape;565;g263304eb28b_1_0:notes"/>
+          <p:cNvPr id="563" name="Google Shape;563;g263304eb28b_1_0:notes"/>
           <p:cNvSpPr txBox="1"/>
           <p:nvPr>
             <p:ph idx="1" type="body"/>
@@ -1623,7 +1623,7 @@
   <p:cSld>
     <p:spTree>
       <p:nvGrpSpPr>
-        <p:cNvPr id="571" name="Shape 571"/>
+        <p:cNvPr id="569" name="Shape 569"/>
         <p:cNvGrpSpPr/>
         <p:nvPr/>
       </p:nvGrpSpPr>
@@ -1637,7 +1637,7 @@
       </p:grpSpPr>
       <p:sp>
         <p:nvSpPr>
-          <p:cNvPr id="572" name="Google Shape;572;g263304eb28b_0_0:notes"/>
+          <p:cNvPr id="570" name="Google Shape;570;g263304eb28b_0_0:notes"/>
           <p:cNvSpPr/>
           <p:nvPr>
             <p:ph idx="2" type="sldImg"/>
@@ -1672,7 +1672,7 @@
       </p:sp>
       <p:sp>
         <p:nvSpPr>
-          <p:cNvPr id="573" name="Google Shape;573;g263304eb28b_0_0:notes"/>
+          <p:cNvPr id="571" name="Google Shape;571;g263304eb28b_0_0:notes"/>
           <p:cNvSpPr txBox="1"/>
           <p:nvPr>
             <p:ph idx="1" type="body"/>
@@ -1722,7 +1722,7 @@
   <p:cSld>
     <p:spTree>
       <p:nvGrpSpPr>
-        <p:cNvPr id="578" name="Shape 578"/>
+        <p:cNvPr id="576" name="Shape 576"/>
         <p:cNvGrpSpPr/>
         <p:nvPr/>
       </p:nvGrpSpPr>
@@ -1736,7 +1736,7 @@
       </p:grpSpPr>
       <p:sp>
         <p:nvSpPr>
-          <p:cNvPr id="579" name="Google Shape;579;g263304eb28b_1_9:notes"/>
+          <p:cNvPr id="577" name="Google Shape;577;g263304eb28b_1_9:notes"/>
           <p:cNvSpPr/>
           <p:nvPr>
             <p:ph idx="2" type="sldImg"/>
@@ -1771,7 +1771,7 @@
       </p:sp>
       <p:sp>
         <p:nvSpPr>
-          <p:cNvPr id="580" name="Google Shape;580;g263304eb28b_1_9:notes"/>
+          <p:cNvPr id="578" name="Google Shape;578;g263304eb28b_1_9:notes"/>
           <p:cNvSpPr txBox="1"/>
           <p:nvPr>
             <p:ph idx="1" type="body"/>
@@ -32670,7 +32670,7 @@
   <p:cSld>
     <p:spTree>
       <p:nvGrpSpPr>
-        <p:cNvPr id="587" name="Shape 587"/>
+        <p:cNvPr id="585" name="Shape 585"/>
         <p:cNvGrpSpPr/>
         <p:nvPr/>
       </p:nvGrpSpPr>
@@ -32684,7 +32684,7 @@
       </p:grpSpPr>
       <p:sp>
         <p:nvSpPr>
-          <p:cNvPr id="588" name="Google Shape;588;p38"/>
+          <p:cNvPr id="586" name="Google Shape;586;p38"/>
           <p:cNvSpPr txBox="1"/>
           <p:nvPr>
             <p:ph type="title"/>
@@ -32960,63 +32960,7 @@
         </p:blipFill>
         <p:spPr>
           <a:xfrm>
-            <a:off x="2287088" y="646186"/>
-            <a:ext cx="4569826" cy="4000450"/>
-          </a:xfrm>
-          <a:prstGeom prst="rect">
-            <a:avLst/>
-          </a:prstGeom>
-          <a:noFill/>
-          <a:ln>
-            <a:noFill/>
-          </a:ln>
-        </p:spPr>
-      </p:pic>
-      <p:pic>
-        <p:nvPicPr>
-          <p:cNvPr id="542" name="Google Shape;542;p31"/>
-          <p:cNvPicPr preferRelativeResize="0"/>
-          <p:nvPr/>
-        </p:nvPicPr>
-        <p:blipFill>
-          <a:blip r:embed="rId4">
-            <a:alphaModFix/>
-          </a:blip>
-          <a:stretch>
-            <a:fillRect/>
-          </a:stretch>
-        </p:blipFill>
-        <p:spPr>
-          <a:xfrm>
-            <a:off x="2226200" y="604650"/>
-            <a:ext cx="4630725" cy="4083475"/>
-          </a:xfrm>
-          <a:prstGeom prst="rect">
-            <a:avLst/>
-          </a:prstGeom>
-          <a:noFill/>
-          <a:ln>
-            <a:noFill/>
-          </a:ln>
-        </p:spPr>
-      </p:pic>
-      <p:pic>
-        <p:nvPicPr>
-          <p:cNvPr id="543" name="Google Shape;543;p31"/>
-          <p:cNvPicPr preferRelativeResize="0"/>
-          <p:nvPr/>
-        </p:nvPicPr>
-        <p:blipFill>
-          <a:blip r:embed="rId5">
-            <a:alphaModFix/>
-          </a:blip>
-          <a:stretch>
-            <a:fillRect/>
-          </a:stretch>
-        </p:blipFill>
-        <p:spPr>
-          <a:xfrm>
-            <a:off x="2287115" y="646159"/>
+            <a:off x="2287078" y="563909"/>
             <a:ext cx="4569826" cy="4015678"/>
           </a:xfrm>
           <a:prstGeom prst="rect">
@@ -33041,7 +32985,7 @@
   <p:cSld>
     <p:spTree>
       <p:nvGrpSpPr>
-        <p:cNvPr id="547" name="Shape 547"/>
+        <p:cNvPr id="545" name="Shape 545"/>
         <p:cNvGrpSpPr/>
         <p:nvPr/>
       </p:nvGrpSpPr>
@@ -33055,7 +32999,7 @@
       </p:grpSpPr>
       <p:sp>
         <p:nvSpPr>
-          <p:cNvPr id="548" name="Google Shape;548;p32"/>
+          <p:cNvPr id="546" name="Google Shape;546;p32"/>
           <p:cNvSpPr txBox="1"/>
           <p:nvPr>
             <p:ph type="title"/>
@@ -33095,7 +33039,7 @@
       </p:sp>
       <p:pic>
         <p:nvPicPr>
-          <p:cNvPr id="549" name="Google Shape;549;p32"/>
+          <p:cNvPr id="547" name="Google Shape;547;p32"/>
           <p:cNvPicPr preferRelativeResize="0"/>
           <p:nvPr/>
         </p:nvPicPr>
@@ -33134,7 +33078,7 @@
   <p:cSld>
     <p:spTree>
       <p:nvGrpSpPr>
-        <p:cNvPr id="553" name="Shape 553"/>
+        <p:cNvPr id="551" name="Shape 551"/>
         <p:cNvGrpSpPr/>
         <p:nvPr/>
       </p:nvGrpSpPr>
@@ -33148,7 +33092,7 @@
       </p:grpSpPr>
       <p:sp>
         <p:nvSpPr>
-          <p:cNvPr id="554" name="Google Shape;554;p33"/>
+          <p:cNvPr id="552" name="Google Shape;552;p33"/>
           <p:cNvSpPr txBox="1"/>
           <p:nvPr>
             <p:ph idx="1" type="body"/>
@@ -33351,7 +33295,7 @@
       </p:sp>
       <p:sp>
         <p:nvSpPr>
-          <p:cNvPr id="555" name="Google Shape;555;p33"/>
+          <p:cNvPr id="553" name="Google Shape;553;p33"/>
           <p:cNvSpPr txBox="1"/>
           <p:nvPr>
             <p:ph type="title"/>
@@ -33391,7 +33335,7 @@
       </p:sp>
       <p:sp>
         <p:nvSpPr>
-          <p:cNvPr id="556" name="Google Shape;556;p33"/>
+          <p:cNvPr id="554" name="Google Shape;554;p33"/>
           <p:cNvSpPr txBox="1"/>
           <p:nvPr>
             <p:ph idx="1" type="body"/>
@@ -33665,7 +33609,7 @@
   <p:cSld>
     <p:spTree>
       <p:nvGrpSpPr>
-        <p:cNvPr id="560" name="Shape 560"/>
+        <p:cNvPr id="558" name="Shape 558"/>
         <p:cNvGrpSpPr/>
         <p:nvPr/>
       </p:nvGrpSpPr>
@@ -33679,7 +33623,7 @@
       </p:grpSpPr>
       <p:sp>
         <p:nvSpPr>
-          <p:cNvPr id="561" name="Google Shape;561;p34"/>
+          <p:cNvPr id="559" name="Google Shape;559;p34"/>
           <p:cNvSpPr txBox="1"/>
           <p:nvPr>
             <p:ph type="title"/>
@@ -33719,7 +33663,7 @@
       </p:sp>
       <p:sp>
         <p:nvSpPr>
-          <p:cNvPr id="562" name="Google Shape;562;p34"/>
+          <p:cNvPr id="560" name="Google Shape;560;p34"/>
           <p:cNvSpPr txBox="1"/>
           <p:nvPr>
             <p:ph idx="1" type="body"/>
@@ -33967,7 +33911,7 @@
   <p:cSld>
     <p:spTree>
       <p:nvGrpSpPr>
-        <p:cNvPr id="566" name="Shape 566"/>
+        <p:cNvPr id="564" name="Shape 564"/>
         <p:cNvGrpSpPr/>
         <p:nvPr/>
       </p:nvGrpSpPr>
@@ -33981,7 +33925,7 @@
       </p:grpSpPr>
       <p:sp>
         <p:nvSpPr>
-          <p:cNvPr id="567" name="Google Shape;567;p35"/>
+          <p:cNvPr id="565" name="Google Shape;565;p35"/>
           <p:cNvSpPr txBox="1"/>
           <p:nvPr>
             <p:ph type="title"/>
@@ -34020,7 +33964,7 @@
       </p:sp>
       <p:sp>
         <p:nvSpPr>
-          <p:cNvPr id="568" name="Google Shape;568;p35"/>
+          <p:cNvPr id="566" name="Google Shape;566;p35"/>
           <p:cNvSpPr txBox="1"/>
           <p:nvPr>
             <p:ph idx="1" type="body"/>
@@ -34059,7 +34003,7 @@
       </p:sp>
       <p:pic>
         <p:nvPicPr>
-          <p:cNvPr id="569" name="Google Shape;569;p35"/>
+          <p:cNvPr id="567" name="Google Shape;567;p35"/>
           <p:cNvPicPr preferRelativeResize="0"/>
           <p:nvPr/>
         </p:nvPicPr>
@@ -34087,7 +34031,7 @@
       </p:pic>
       <p:pic>
         <p:nvPicPr>
-          <p:cNvPr id="570" name="Google Shape;570;p35"/>
+          <p:cNvPr id="568" name="Google Shape;568;p35"/>
           <p:cNvPicPr preferRelativeResize="0"/>
           <p:nvPr/>
         </p:nvPicPr>
@@ -34126,7 +34070,7 @@
   <p:cSld>
     <p:spTree>
       <p:nvGrpSpPr>
-        <p:cNvPr id="574" name="Shape 574"/>
+        <p:cNvPr id="572" name="Shape 572"/>
         <p:cNvGrpSpPr/>
         <p:nvPr/>
       </p:nvGrpSpPr>
@@ -34140,7 +34084,7 @@
       </p:grpSpPr>
       <p:sp>
         <p:nvSpPr>
-          <p:cNvPr id="575" name="Google Shape;575;p36"/>
+          <p:cNvPr id="573" name="Google Shape;573;p36"/>
           <p:cNvSpPr txBox="1"/>
           <p:nvPr>
             <p:ph type="title"/>
@@ -34179,7 +34123,7 @@
       </p:sp>
       <p:sp>
         <p:nvSpPr>
-          <p:cNvPr id="576" name="Google Shape;576;p36"/>
+          <p:cNvPr id="574" name="Google Shape;574;p36"/>
           <p:cNvSpPr txBox="1"/>
           <p:nvPr>
             <p:ph idx="1" type="body"/>
@@ -34218,7 +34162,7 @@
       </p:sp>
       <p:pic>
         <p:nvPicPr>
-          <p:cNvPr id="577" name="Google Shape;577;p36"/>
+          <p:cNvPr id="575" name="Google Shape;575;p36"/>
           <p:cNvPicPr preferRelativeResize="0"/>
           <p:nvPr/>
         </p:nvPicPr>
@@ -34257,7 +34201,7 @@
   <p:cSld>
     <p:spTree>
       <p:nvGrpSpPr>
-        <p:cNvPr id="581" name="Shape 581"/>
+        <p:cNvPr id="579" name="Shape 579"/>
         <p:cNvGrpSpPr/>
         <p:nvPr/>
       </p:nvGrpSpPr>
@@ -34271,7 +34215,7 @@
       </p:grpSpPr>
       <p:pic>
         <p:nvPicPr>
-          <p:cNvPr id="582" name="Google Shape;582;p37"/>
+          <p:cNvPr id="580" name="Google Shape;580;p37"/>
           <p:cNvPicPr preferRelativeResize="0"/>
           <p:nvPr/>
         </p:nvPicPr>
@@ -34298,7 +34242,7 @@
       </p:pic>
       <p:pic>
         <p:nvPicPr>
-          <p:cNvPr id="583" name="Google Shape;583;p37"/>
+          <p:cNvPr id="581" name="Google Shape;581;p37"/>
           <p:cNvPicPr preferRelativeResize="0"/>
           <p:nvPr/>
         </p:nvPicPr>
@@ -34332,6 +34276,285 @@
 </file>
 
 <file path=ppt/theme/theme1.xml><?xml version="1.0" encoding="utf-8"?>
+<a:theme xmlns:a="http://schemas.openxmlformats.org/drawingml/2006/main" xmlns:r="http://schemas.openxmlformats.org/officeDocument/2006/relationships">
+  <a:themeElements>
+    <a:clrScheme name="Default">
+      <a:dk1>
+        <a:srgbClr val="000000"/>
+      </a:dk1>
+      <a:lt1>
+        <a:srgbClr val="FFFFFF"/>
+      </a:lt1>
+      <a:dk2>
+        <a:srgbClr val="158158"/>
+      </a:dk2>
+      <a:lt2>
+        <a:srgbClr val="F3F3F3"/>
+      </a:lt2>
+      <a:accent1>
+        <a:srgbClr val="058DC7"/>
+      </a:accent1>
+      <a:accent2>
+        <a:srgbClr val="50B432"/>
+      </a:accent2>
+      <a:accent3>
+        <a:srgbClr val="ED561B"/>
+      </a:accent3>
+      <a:accent4>
+        <a:srgbClr val="EDEF00"/>
+      </a:accent4>
+      <a:accent5>
+        <a:srgbClr val="24CBE5"/>
+      </a:accent5>
+      <a:accent6>
+        <a:srgbClr val="64E572"/>
+      </a:accent6>
+      <a:hlink>
+        <a:srgbClr val="2200CC"/>
+      </a:hlink>
+      <a:folHlink>
+        <a:srgbClr val="551A8B"/>
+      </a:folHlink>
+    </a:clrScheme>
+    <a:fontScheme name="Office">
+      <a:majorFont>
+        <a:latin typeface="Arial"/>
+        <a:ea typeface=""/>
+        <a:cs typeface=""/>
+        <a:font script="Jpan" typeface="ＭＳ Ｐゴシック"/>
+        <a:font script="Hang" typeface="맑은 고딕"/>
+        <a:font script="Hans" typeface="宋体"/>
+        <a:font script="Hant" typeface="新細明體"/>
+        <a:font script="Arab" typeface="Times New Roman"/>
+        <a:font script="Hebr" typeface="Times New Roman"/>
+        <a:font script="Thai" typeface="Angsana New"/>
+        <a:font script="Ethi" typeface="Nyala"/>
+        <a:font script="Beng" typeface="Vrinda"/>
+        <a:font script="Gujr" typeface="Shruti"/>
+        <a:font script="Khmr" typeface="MoolBoran"/>
+        <a:font script="Knda" typeface="Tunga"/>
+        <a:font script="Guru" typeface="Raavi"/>
+        <a:font script="Cans" typeface="Euphemia"/>
+        <a:font script="Cher" typeface="Plantagenet Cherokee"/>
+        <a:font script="Yiii" typeface="Microsoft Yi Baiti"/>
+        <a:font script="Tibt" typeface="Microsoft Himalaya"/>
+        <a:font script="Thaa" typeface="MV Boli"/>
+        <a:font script="Deva" typeface="Mangal"/>
+        <a:font script="Telu" typeface="Gautami"/>
+        <a:font script="Taml" typeface="Latha"/>
+        <a:font script="Syrc" typeface="Estrangelo Edessa"/>
+        <a:font script="Orya" typeface="Kalinga"/>
+        <a:font script="Mlym" typeface="Kartika"/>
+        <a:font script="Laoo" typeface="DokChampa"/>
+        <a:font script="Sinh" typeface="Iskoola Pota"/>
+        <a:font script="Mong" typeface="Mongolian Baiti"/>
+        <a:font script="Viet" typeface="Times New Roman"/>
+        <a:font script="Uigh" typeface="Microsoft Uighur"/>
+        <a:font script="Geor" typeface="Sylfaen"/>
+      </a:majorFont>
+      <a:minorFont>
+        <a:latin typeface="Arial"/>
+        <a:ea typeface=""/>
+        <a:cs typeface=""/>
+        <a:font script="Jpan" typeface="ＭＳ Ｐゴシック"/>
+        <a:font script="Hang" typeface="맑은 고딕"/>
+        <a:font script="Hans" typeface="宋体"/>
+        <a:font script="Hant" typeface="新細明體"/>
+        <a:font script="Arab" typeface="Arial"/>
+        <a:font script="Hebr" typeface="Arial"/>
+        <a:font script="Thai" typeface="Cordia New"/>
+        <a:font script="Ethi" typeface="Nyala"/>
+        <a:font script="Beng" typeface="Vrinda"/>
+        <a:font script="Gujr" typeface="Shruti"/>
+        <a:font script="Khmr" typeface="DaunPenh"/>
+        <a:font script="Knda" typeface="Tunga"/>
+        <a:font script="Guru" typeface="Raavi"/>
+        <a:font script="Cans" typeface="Euphemia"/>
+        <a:font script="Cher" typeface="Plantagenet Cherokee"/>
+        <a:font script="Yiii" typeface="Microsoft Yi Baiti"/>
+        <a:font script="Tibt" typeface="Microsoft Himalaya"/>
+        <a:font script="Thaa" typeface="MV Boli"/>
+        <a:font script="Deva" typeface="Mangal"/>
+        <a:font script="Telu" typeface="Gautami"/>
+        <a:font script="Taml" typeface="Latha"/>
+        <a:font script="Syrc" typeface="Estrangelo Edessa"/>
+        <a:font script="Orya" typeface="Kalinga"/>
+        <a:font script="Mlym" typeface="Kartika"/>
+        <a:font script="Laoo" typeface="DokChampa"/>
+        <a:font script="Sinh" typeface="Iskoola Pota"/>
+        <a:font script="Mong" typeface="Mongolian Baiti"/>
+        <a:font script="Viet" typeface="Arial"/>
+        <a:font script="Uigh" typeface="Microsoft Uighur"/>
+        <a:font script="Geor" typeface="Sylfaen"/>
+      </a:minorFont>
+    </a:fontScheme>
+    <a:fmtScheme name="Office">
+      <a:fillStyleLst>
+        <a:solidFill>
+          <a:schemeClr val="phClr"/>
+        </a:solidFill>
+        <a:gradFill rotWithShape="1">
+          <a:gsLst>
+            <a:gs pos="0">
+              <a:schemeClr val="phClr">
+                <a:tint val="50000"/>
+                <a:satMod val="300000"/>
+              </a:schemeClr>
+            </a:gs>
+            <a:gs pos="35000">
+              <a:schemeClr val="phClr">
+                <a:tint val="37000"/>
+                <a:satMod val="300000"/>
+              </a:schemeClr>
+            </a:gs>
+            <a:gs pos="100000">
+              <a:schemeClr val="phClr">
+                <a:tint val="15000"/>
+                <a:satMod val="350000"/>
+              </a:schemeClr>
+            </a:gs>
+          </a:gsLst>
+          <a:lin ang="16200000" scaled="1"/>
+        </a:gradFill>
+        <a:gradFill rotWithShape="1">
+          <a:gsLst>
+            <a:gs pos="0">
+              <a:schemeClr val="phClr">
+                <a:tint val="100000"/>
+                <a:shade val="100000"/>
+                <a:satMod val="130000"/>
+              </a:schemeClr>
+            </a:gs>
+            <a:gs pos="100000">
+              <a:schemeClr val="phClr">
+                <a:tint val="50000"/>
+                <a:shade val="100000"/>
+                <a:satMod val="350000"/>
+              </a:schemeClr>
+            </a:gs>
+          </a:gsLst>
+          <a:lin ang="16200000" scaled="0"/>
+        </a:gradFill>
+      </a:fillStyleLst>
+      <a:lnStyleLst>
+        <a:ln w="9525" cap="flat" cmpd="sng" algn="ctr">
+          <a:solidFill>
+            <a:schemeClr val="phClr">
+              <a:shade val="95000"/>
+              <a:satMod val="105000"/>
+            </a:schemeClr>
+          </a:solidFill>
+          <a:prstDash val="solid"/>
+        </a:ln>
+        <a:ln w="25400" cap="flat" cmpd="sng" algn="ctr">
+          <a:solidFill>
+            <a:schemeClr val="phClr"/>
+          </a:solidFill>
+          <a:prstDash val="solid"/>
+        </a:ln>
+        <a:ln w="38100" cap="flat" cmpd="sng" algn="ctr">
+          <a:solidFill>
+            <a:schemeClr val="phClr"/>
+          </a:solidFill>
+          <a:prstDash val="solid"/>
+        </a:ln>
+      </a:lnStyleLst>
+      <a:effectStyleLst>
+        <a:effectStyle>
+          <a:effectLst>
+            <a:outerShdw blurRad="40000" dist="20000" dir="5400000" rotWithShape="0">
+              <a:srgbClr val="000000">
+                <a:alpha val="38000"/>
+              </a:srgbClr>
+            </a:outerShdw>
+          </a:effectLst>
+        </a:effectStyle>
+        <a:effectStyle>
+          <a:effectLst>
+            <a:outerShdw blurRad="40000" dist="23000" dir="5400000" rotWithShape="0">
+              <a:srgbClr val="000000">
+                <a:alpha val="35000"/>
+              </a:srgbClr>
+            </a:outerShdw>
+          </a:effectLst>
+        </a:effectStyle>
+        <a:effectStyle>
+          <a:effectLst>
+            <a:outerShdw blurRad="40000" dist="23000" dir="5400000" rotWithShape="0">
+              <a:srgbClr val="000000">
+                <a:alpha val="35000"/>
+              </a:srgbClr>
+            </a:outerShdw>
+          </a:effectLst>
+          <a:scene3d>
+            <a:camera prst="orthographicFront">
+              <a:rot lat="0" lon="0" rev="0"/>
+            </a:camera>
+            <a:lightRig rig="threePt" dir="t">
+              <a:rot lat="0" lon="0" rev="1200000"/>
+            </a:lightRig>
+          </a:scene3d>
+          <a:sp3d>
+            <a:bevelT w="63500" h="25400"/>
+          </a:sp3d>
+        </a:effectStyle>
+      </a:effectStyleLst>
+      <a:bgFillStyleLst>
+        <a:solidFill>
+          <a:schemeClr val="phClr"/>
+        </a:solidFill>
+        <a:gradFill rotWithShape="1">
+          <a:gsLst>
+            <a:gs pos="0">
+              <a:schemeClr val="phClr">
+                <a:tint val="40000"/>
+                <a:satMod val="350000"/>
+              </a:schemeClr>
+            </a:gs>
+            <a:gs pos="40000">
+              <a:schemeClr val="phClr">
+                <a:tint val="45000"/>
+                <a:shade val="99000"/>
+                <a:satMod val="350000"/>
+              </a:schemeClr>
+            </a:gs>
+            <a:gs pos="100000">
+              <a:schemeClr val="phClr">
+                <a:shade val="20000"/>
+                <a:satMod val="255000"/>
+              </a:schemeClr>
+            </a:gs>
+          </a:gsLst>
+          <a:path path="circle">
+            <a:fillToRect l="50000" t="-80000" r="50000" b="180000"/>
+          </a:path>
+        </a:gradFill>
+        <a:gradFill rotWithShape="1">
+          <a:gsLst>
+            <a:gs pos="0">
+              <a:schemeClr val="phClr">
+                <a:tint val="80000"/>
+                <a:satMod val="300000"/>
+              </a:schemeClr>
+            </a:gs>
+            <a:gs pos="100000">
+              <a:schemeClr val="phClr">
+                <a:shade val="30000"/>
+                <a:satMod val="200000"/>
+              </a:schemeClr>
+            </a:gs>
+          </a:gsLst>
+          <a:path path="circle">
+            <a:fillToRect l="50000" t="50000" r="50000" b="50000"/>
+          </a:path>
+        </a:gradFill>
+      </a:bgFillStyleLst>
+    </a:fmtScheme>
+  </a:themeElements>
+</a:theme>
+</file>
+
+<file path=ppt/theme/theme2.xml><?xml version="1.0" encoding="utf-8"?>
 <a:theme xmlns:a="http://schemas.openxmlformats.org/drawingml/2006/main" xmlns:r="http://schemas.openxmlformats.org/officeDocument/2006/relationships" name="Forensic Science Thesis Defense by Slidesgo">
   <a:themeElements>
     <a:clrScheme name="Simple Light">
@@ -34608,283 +34831,4 @@
     </a:fmtScheme>
   </a:themeElements>
 </a:theme>
-</file>
-
-<file path=ppt/theme/theme2.xml><?xml version="1.0" encoding="utf-8"?>
-<a:theme xmlns:a="http://schemas.openxmlformats.org/drawingml/2006/main" xmlns:r="http://schemas.openxmlformats.org/officeDocument/2006/relationships">
-  <a:themeElements>
-    <a:clrScheme name="Default">
-      <a:dk1>
-        <a:srgbClr val="000000"/>
-      </a:dk1>
-      <a:lt1>
-        <a:srgbClr val="FFFFFF"/>
-      </a:lt1>
-      <a:dk2>
-        <a:srgbClr val="158158"/>
-      </a:dk2>
-      <a:lt2>
-        <a:srgbClr val="F3F3F3"/>
-      </a:lt2>
-      <a:accent1>
-        <a:srgbClr val="058DC7"/>
-      </a:accent1>
-      <a:accent2>
-        <a:srgbClr val="50B432"/>
-      </a:accent2>
-      <a:accent3>
-        <a:srgbClr val="ED561B"/>
-      </a:accent3>
-      <a:accent4>
-        <a:srgbClr val="EDEF00"/>
-      </a:accent4>
-      <a:accent5>
-        <a:srgbClr val="24CBE5"/>
-      </a:accent5>
-      <a:accent6>
-        <a:srgbClr val="64E572"/>
-      </a:accent6>
-      <a:hlink>
-        <a:srgbClr val="2200CC"/>
-      </a:hlink>
-      <a:folHlink>
-        <a:srgbClr val="551A8B"/>
-      </a:folHlink>
-    </a:clrScheme>
-    <a:fontScheme name="Office">
-      <a:majorFont>
-        <a:latin typeface="Arial"/>
-        <a:ea typeface=""/>
-        <a:cs typeface=""/>
-        <a:font script="Jpan" typeface="ＭＳ Ｐゴシック"/>
-        <a:font script="Hang" typeface="맑은 고딕"/>
-        <a:font script="Hans" typeface="宋体"/>
-        <a:font script="Hant" typeface="新細明體"/>
-        <a:font script="Arab" typeface="Times New Roman"/>
-        <a:font script="Hebr" typeface="Times New Roman"/>
-        <a:font script="Thai" typeface="Angsana New"/>
-        <a:font script="Ethi" typeface="Nyala"/>
-        <a:font script="Beng" typeface="Vrinda"/>
-        <a:font script="Gujr" typeface="Shruti"/>
-        <a:font script="Khmr" typeface="MoolBoran"/>
-        <a:font script="Knda" typeface="Tunga"/>
-        <a:font script="Guru" typeface="Raavi"/>
-        <a:font script="Cans" typeface="Euphemia"/>
-        <a:font script="Cher" typeface="Plantagenet Cherokee"/>
-        <a:font script="Yiii" typeface="Microsoft Yi Baiti"/>
-        <a:font script="Tibt" typeface="Microsoft Himalaya"/>
-        <a:font script="Thaa" typeface="MV Boli"/>
-        <a:font script="Deva" typeface="Mangal"/>
-        <a:font script="Telu" typeface="Gautami"/>
-        <a:font script="Taml" typeface="Latha"/>
-        <a:font script="Syrc" typeface="Estrangelo Edessa"/>
-        <a:font script="Orya" typeface="Kalinga"/>
-        <a:font script="Mlym" typeface="Kartika"/>
-        <a:font script="Laoo" typeface="DokChampa"/>
-        <a:font script="Sinh" typeface="Iskoola Pota"/>
-        <a:font script="Mong" typeface="Mongolian Baiti"/>
-        <a:font script="Viet" typeface="Times New Roman"/>
-        <a:font script="Uigh" typeface="Microsoft Uighur"/>
-        <a:font script="Geor" typeface="Sylfaen"/>
-      </a:majorFont>
-      <a:minorFont>
-        <a:latin typeface="Arial"/>
-        <a:ea typeface=""/>
-        <a:cs typeface=""/>
-        <a:font script="Jpan" typeface="ＭＳ Ｐゴシック"/>
-        <a:font script="Hang" typeface="맑은 고딕"/>
-        <a:font script="Hans" typeface="宋体"/>
-        <a:font script="Hant" typeface="新細明體"/>
-        <a:font script="Arab" typeface="Arial"/>
-        <a:font script="Hebr" typeface="Arial"/>
-        <a:font script="Thai" typeface="Cordia New"/>
-        <a:font script="Ethi" typeface="Nyala"/>
-        <a:font script="Beng" typeface="Vrinda"/>
-        <a:font script="Gujr" typeface="Shruti"/>
-        <a:font script="Khmr" typeface="DaunPenh"/>
-        <a:font script="Knda" typeface="Tunga"/>
-        <a:font script="Guru" typeface="Raavi"/>
-        <a:font script="Cans" typeface="Euphemia"/>
-        <a:font script="Cher" typeface="Plantagenet Cherokee"/>
-        <a:font script="Yiii" typeface="Microsoft Yi Baiti"/>
-        <a:font script="Tibt" typeface="Microsoft Himalaya"/>
-        <a:font script="Thaa" typeface="MV Boli"/>
-        <a:font script="Deva" typeface="Mangal"/>
-        <a:font script="Telu" typeface="Gautami"/>
-        <a:font script="Taml" typeface="Latha"/>
-        <a:font script="Syrc" typeface="Estrangelo Edessa"/>
-        <a:font script="Orya" typeface="Kalinga"/>
-        <a:font script="Mlym" typeface="Kartika"/>
-        <a:font script="Laoo" typeface="DokChampa"/>
-        <a:font script="Sinh" typeface="Iskoola Pota"/>
-        <a:font script="Mong" typeface="Mongolian Baiti"/>
-        <a:font script="Viet" typeface="Arial"/>
-        <a:font script="Uigh" typeface="Microsoft Uighur"/>
-        <a:font script="Geor" typeface="Sylfaen"/>
-      </a:minorFont>
-    </a:fontScheme>
-    <a:fmtScheme name="Office">
-      <a:fillStyleLst>
-        <a:solidFill>
-          <a:schemeClr val="phClr"/>
-        </a:solidFill>
-        <a:gradFill rotWithShape="1">
-          <a:gsLst>
-            <a:gs pos="0">
-              <a:schemeClr val="phClr">
-                <a:tint val="50000"/>
-                <a:satMod val="300000"/>
-              </a:schemeClr>
-            </a:gs>
-            <a:gs pos="35000">
-              <a:schemeClr val="phClr">
-                <a:tint val="37000"/>
-                <a:satMod val="300000"/>
-              </a:schemeClr>
-            </a:gs>
-            <a:gs pos="100000">
-              <a:schemeClr val="phClr">
-                <a:tint val="15000"/>
-                <a:satMod val="350000"/>
-              </a:schemeClr>
-            </a:gs>
-          </a:gsLst>
-          <a:lin ang="16200000" scaled="1"/>
-        </a:gradFill>
-        <a:gradFill rotWithShape="1">
-          <a:gsLst>
-            <a:gs pos="0">
-              <a:schemeClr val="phClr">
-                <a:tint val="100000"/>
-                <a:shade val="100000"/>
-                <a:satMod val="130000"/>
-              </a:schemeClr>
-            </a:gs>
-            <a:gs pos="100000">
-              <a:schemeClr val="phClr">
-                <a:tint val="50000"/>
-                <a:shade val="100000"/>
-                <a:satMod val="350000"/>
-              </a:schemeClr>
-            </a:gs>
-          </a:gsLst>
-          <a:lin ang="16200000" scaled="0"/>
-        </a:gradFill>
-      </a:fillStyleLst>
-      <a:lnStyleLst>
-        <a:ln w="9525" cap="flat" cmpd="sng" algn="ctr">
-          <a:solidFill>
-            <a:schemeClr val="phClr">
-              <a:shade val="95000"/>
-              <a:satMod val="105000"/>
-            </a:schemeClr>
-          </a:solidFill>
-          <a:prstDash val="solid"/>
-        </a:ln>
-        <a:ln w="25400" cap="flat" cmpd="sng" algn="ctr">
-          <a:solidFill>
-            <a:schemeClr val="phClr"/>
-          </a:solidFill>
-          <a:prstDash val="solid"/>
-        </a:ln>
-        <a:ln w="38100" cap="flat" cmpd="sng" algn="ctr">
-          <a:solidFill>
-            <a:schemeClr val="phClr"/>
-          </a:solidFill>
-          <a:prstDash val="solid"/>
-        </a:ln>
-      </a:lnStyleLst>
-      <a:effectStyleLst>
-        <a:effectStyle>
-          <a:effectLst>
-            <a:outerShdw blurRad="40000" dist="20000" dir="5400000" rotWithShape="0">
-              <a:srgbClr val="000000">
-                <a:alpha val="38000"/>
-              </a:srgbClr>
-            </a:outerShdw>
-          </a:effectLst>
-        </a:effectStyle>
-        <a:effectStyle>
-          <a:effectLst>
-            <a:outerShdw blurRad="40000" dist="23000" dir="5400000" rotWithShape="0">
-              <a:srgbClr val="000000">
-                <a:alpha val="35000"/>
-              </a:srgbClr>
-            </a:outerShdw>
-          </a:effectLst>
-        </a:effectStyle>
-        <a:effectStyle>
-          <a:effectLst>
-            <a:outerShdw blurRad="40000" dist="23000" dir="5400000" rotWithShape="0">
-              <a:srgbClr val="000000">
-                <a:alpha val="35000"/>
-              </a:srgbClr>
-            </a:outerShdw>
-          </a:effectLst>
-          <a:scene3d>
-            <a:camera prst="orthographicFront">
-              <a:rot lat="0" lon="0" rev="0"/>
-            </a:camera>
-            <a:lightRig rig="threePt" dir="t">
-              <a:rot lat="0" lon="0" rev="1200000"/>
-            </a:lightRig>
-          </a:scene3d>
-          <a:sp3d>
-            <a:bevelT w="63500" h="25400"/>
-          </a:sp3d>
-        </a:effectStyle>
-      </a:effectStyleLst>
-      <a:bgFillStyleLst>
-        <a:solidFill>
-          <a:schemeClr val="phClr"/>
-        </a:solidFill>
-        <a:gradFill rotWithShape="1">
-          <a:gsLst>
-            <a:gs pos="0">
-              <a:schemeClr val="phClr">
-                <a:tint val="40000"/>
-                <a:satMod val="350000"/>
-              </a:schemeClr>
-            </a:gs>
-            <a:gs pos="40000">
-              <a:schemeClr val="phClr">
-                <a:tint val="45000"/>
-                <a:shade val="99000"/>
-                <a:satMod val="350000"/>
-              </a:schemeClr>
-            </a:gs>
-            <a:gs pos="100000">
-              <a:schemeClr val="phClr">
-                <a:shade val="20000"/>
-                <a:satMod val="255000"/>
-              </a:schemeClr>
-            </a:gs>
-          </a:gsLst>
-          <a:path path="circle">
-            <a:fillToRect l="50000" t="-80000" r="50000" b="180000"/>
-          </a:path>
-        </a:gradFill>
-        <a:gradFill rotWithShape="1">
-          <a:gsLst>
-            <a:gs pos="0">
-              <a:schemeClr val="phClr">
-                <a:tint val="80000"/>
-                <a:satMod val="300000"/>
-              </a:schemeClr>
-            </a:gs>
-            <a:gs pos="100000">
-              <a:schemeClr val="phClr">
-                <a:shade val="30000"/>
-                <a:satMod val="200000"/>
-              </a:schemeClr>
-            </a:gs>
-          </a:gsLst>
-          <a:path path="circle">
-            <a:fillToRect l="50000" t="50000" r="50000" b="50000"/>
-          </a:path>
-        </a:gradFill>
-      </a:bgFillStyleLst>
-    </a:fmtScheme>
-  </a:themeElements>
-</a:theme>
 </file>
</xml_diff>

<commit_message>
Phase 3: Update powerpoint slides w/ corrections
</commit_message>
<xml_diff>
--- a/Phase 3/CSE111-Phase 3.pptx
+++ b/Phase 3/CSE111-Phase 3.pptx
@@ -32585,6 +32585,21 @@
           </a:bodyPr>
           <a:lstStyle/>
           <a:p>
+            <a:pPr indent="0" lvl="0" marL="0" rtl="0" algn="l">
+              <a:spcBef>
+                <a:spcPts val="0"/>
+              </a:spcBef>
+              <a:spcAft>
+                <a:spcPts val="0"/>
+              </a:spcAft>
+              <a:buNone/>
+            </a:pPr>
+            <a:r>
+              <a:t/>
+            </a:r>
+            <a:endParaRPr/>
+          </a:p>
+          <a:p>
             <a:pPr indent="0" lvl="0" marL="0" rtl="0" algn="ctr">
               <a:spcBef>
                 <a:spcPts val="0"/>
@@ -32596,7 +32611,7 @@
             </a:pPr>
             <a:r>
               <a:rPr lang="en"/>
-              <a:t>CSE 111 Checkpoint I</a:t>
+              <a:t>UC Merced Course Scheduler</a:t>
             </a:r>
             <a:endParaRPr/>
           </a:p>
@@ -32636,7 +32651,7 @@
             </a:pPr>
             <a:r>
               <a:rPr lang="en"/>
-              <a:t>Course Stats for UC Merced</a:t>
+              <a:t>Kavin Rajasekaran &amp; Sahus Nulu</a:t>
             </a:r>
             <a:endParaRPr/>
           </a:p>
@@ -33152,7 +33167,7 @@
             </a:r>
             <a:r>
               <a:rPr lang="en" sz="1600"/>
-              <a:t>, name, semester, section</a:t>
+              <a:t>, teacherID, name, semester, section</a:t>
             </a:r>
             <a:endParaRPr sz="1600"/>
           </a:p>
@@ -34276,6 +34291,285 @@
 </file>
 
 <file path=ppt/theme/theme1.xml><?xml version="1.0" encoding="utf-8"?>
+<a:theme xmlns:a="http://schemas.openxmlformats.org/drawingml/2006/main" xmlns:r="http://schemas.openxmlformats.org/officeDocument/2006/relationships" name="Forensic Science Thesis Defense by Slidesgo">
+  <a:themeElements>
+    <a:clrScheme name="Simple Light">
+      <a:dk1>
+        <a:srgbClr val="F6CA8C"/>
+      </a:dk1>
+      <a:lt1>
+        <a:srgbClr val="020202"/>
+      </a:lt1>
+      <a:dk2>
+        <a:srgbClr val="F2F3ED"/>
+      </a:dk2>
+      <a:lt2>
+        <a:srgbClr val="DDAC67"/>
+      </a:lt2>
+      <a:accent1>
+        <a:srgbClr val="FDE2BD"/>
+      </a:accent1>
+      <a:accent2>
+        <a:srgbClr val="FFFFFF"/>
+      </a:accent2>
+      <a:accent3>
+        <a:srgbClr val="FFFFFF"/>
+      </a:accent3>
+      <a:accent4>
+        <a:srgbClr val="FFFFFF"/>
+      </a:accent4>
+      <a:accent5>
+        <a:srgbClr val="FFFFFF"/>
+      </a:accent5>
+      <a:accent6>
+        <a:srgbClr val="FFFFFF"/>
+      </a:accent6>
+      <a:hlink>
+        <a:srgbClr val="F2F3ED"/>
+      </a:hlink>
+      <a:folHlink>
+        <a:srgbClr val="0097A7"/>
+      </a:folHlink>
+    </a:clrScheme>
+    <a:fontScheme name="Office">
+      <a:majorFont>
+        <a:latin typeface="Arial"/>
+        <a:ea typeface=""/>
+        <a:cs typeface=""/>
+        <a:font script="Jpan" typeface="ＭＳ Ｐゴシック"/>
+        <a:font script="Hang" typeface="맑은 고딕"/>
+        <a:font script="Hans" typeface="宋体"/>
+        <a:font script="Hant" typeface="新細明體"/>
+        <a:font script="Arab" typeface="Times New Roman"/>
+        <a:font script="Hebr" typeface="Times New Roman"/>
+        <a:font script="Thai" typeface="Angsana New"/>
+        <a:font script="Ethi" typeface="Nyala"/>
+        <a:font script="Beng" typeface="Vrinda"/>
+        <a:font script="Gujr" typeface="Shruti"/>
+        <a:font script="Khmr" typeface="MoolBoran"/>
+        <a:font script="Knda" typeface="Tunga"/>
+        <a:font script="Guru" typeface="Raavi"/>
+        <a:font script="Cans" typeface="Euphemia"/>
+        <a:font script="Cher" typeface="Plantagenet Cherokee"/>
+        <a:font script="Yiii" typeface="Microsoft Yi Baiti"/>
+        <a:font script="Tibt" typeface="Microsoft Himalaya"/>
+        <a:font script="Thaa" typeface="MV Boli"/>
+        <a:font script="Deva" typeface="Mangal"/>
+        <a:font script="Telu" typeface="Gautami"/>
+        <a:font script="Taml" typeface="Latha"/>
+        <a:font script="Syrc" typeface="Estrangelo Edessa"/>
+        <a:font script="Orya" typeface="Kalinga"/>
+        <a:font script="Mlym" typeface="Kartika"/>
+        <a:font script="Laoo" typeface="DokChampa"/>
+        <a:font script="Sinh" typeface="Iskoola Pota"/>
+        <a:font script="Mong" typeface="Mongolian Baiti"/>
+        <a:font script="Viet" typeface="Times New Roman"/>
+        <a:font script="Uigh" typeface="Microsoft Uighur"/>
+        <a:font script="Geor" typeface="Sylfaen"/>
+      </a:majorFont>
+      <a:minorFont>
+        <a:latin typeface="Arial"/>
+        <a:ea typeface=""/>
+        <a:cs typeface=""/>
+        <a:font script="Jpan" typeface="ＭＳ Ｐゴシック"/>
+        <a:font script="Hang" typeface="맑은 고딕"/>
+        <a:font script="Hans" typeface="宋体"/>
+        <a:font script="Hant" typeface="新細明體"/>
+        <a:font script="Arab" typeface="Arial"/>
+        <a:font script="Hebr" typeface="Arial"/>
+        <a:font script="Thai" typeface="Cordia New"/>
+        <a:font script="Ethi" typeface="Nyala"/>
+        <a:font script="Beng" typeface="Vrinda"/>
+        <a:font script="Gujr" typeface="Shruti"/>
+        <a:font script="Khmr" typeface="DaunPenh"/>
+        <a:font script="Knda" typeface="Tunga"/>
+        <a:font script="Guru" typeface="Raavi"/>
+        <a:font script="Cans" typeface="Euphemia"/>
+        <a:font script="Cher" typeface="Plantagenet Cherokee"/>
+        <a:font script="Yiii" typeface="Microsoft Yi Baiti"/>
+        <a:font script="Tibt" typeface="Microsoft Himalaya"/>
+        <a:font script="Thaa" typeface="MV Boli"/>
+        <a:font script="Deva" typeface="Mangal"/>
+        <a:font script="Telu" typeface="Gautami"/>
+        <a:font script="Taml" typeface="Latha"/>
+        <a:font script="Syrc" typeface="Estrangelo Edessa"/>
+        <a:font script="Orya" typeface="Kalinga"/>
+        <a:font script="Mlym" typeface="Kartika"/>
+        <a:font script="Laoo" typeface="DokChampa"/>
+        <a:font script="Sinh" typeface="Iskoola Pota"/>
+        <a:font script="Mong" typeface="Mongolian Baiti"/>
+        <a:font script="Viet" typeface="Arial"/>
+        <a:font script="Uigh" typeface="Microsoft Uighur"/>
+        <a:font script="Geor" typeface="Sylfaen"/>
+      </a:minorFont>
+    </a:fontScheme>
+    <a:fmtScheme name="Office">
+      <a:fillStyleLst>
+        <a:solidFill>
+          <a:schemeClr val="phClr"/>
+        </a:solidFill>
+        <a:gradFill rotWithShape="1">
+          <a:gsLst>
+            <a:gs pos="0">
+              <a:schemeClr val="phClr">
+                <a:tint val="50000"/>
+                <a:satMod val="300000"/>
+              </a:schemeClr>
+            </a:gs>
+            <a:gs pos="35000">
+              <a:schemeClr val="phClr">
+                <a:tint val="37000"/>
+                <a:satMod val="300000"/>
+              </a:schemeClr>
+            </a:gs>
+            <a:gs pos="100000">
+              <a:schemeClr val="phClr">
+                <a:tint val="15000"/>
+                <a:satMod val="350000"/>
+              </a:schemeClr>
+            </a:gs>
+          </a:gsLst>
+          <a:lin ang="16200000" scaled="1"/>
+        </a:gradFill>
+        <a:gradFill rotWithShape="1">
+          <a:gsLst>
+            <a:gs pos="0">
+              <a:schemeClr val="phClr">
+                <a:tint val="100000"/>
+                <a:shade val="100000"/>
+                <a:satMod val="130000"/>
+              </a:schemeClr>
+            </a:gs>
+            <a:gs pos="100000">
+              <a:schemeClr val="phClr">
+                <a:tint val="50000"/>
+                <a:shade val="100000"/>
+                <a:satMod val="350000"/>
+              </a:schemeClr>
+            </a:gs>
+          </a:gsLst>
+          <a:lin ang="16200000" scaled="0"/>
+        </a:gradFill>
+      </a:fillStyleLst>
+      <a:lnStyleLst>
+        <a:ln w="9525" cap="flat" cmpd="sng" algn="ctr">
+          <a:solidFill>
+            <a:schemeClr val="phClr">
+              <a:shade val="95000"/>
+              <a:satMod val="105000"/>
+            </a:schemeClr>
+          </a:solidFill>
+          <a:prstDash val="solid"/>
+        </a:ln>
+        <a:ln w="25400" cap="flat" cmpd="sng" algn="ctr">
+          <a:solidFill>
+            <a:schemeClr val="phClr"/>
+          </a:solidFill>
+          <a:prstDash val="solid"/>
+        </a:ln>
+        <a:ln w="38100" cap="flat" cmpd="sng" algn="ctr">
+          <a:solidFill>
+            <a:schemeClr val="phClr"/>
+          </a:solidFill>
+          <a:prstDash val="solid"/>
+        </a:ln>
+      </a:lnStyleLst>
+      <a:effectStyleLst>
+        <a:effectStyle>
+          <a:effectLst>
+            <a:outerShdw blurRad="40000" dist="20000" dir="5400000" rotWithShape="0">
+              <a:srgbClr val="000000">
+                <a:alpha val="38000"/>
+              </a:srgbClr>
+            </a:outerShdw>
+          </a:effectLst>
+        </a:effectStyle>
+        <a:effectStyle>
+          <a:effectLst>
+            <a:outerShdw blurRad="40000" dist="23000" dir="5400000" rotWithShape="0">
+              <a:srgbClr val="000000">
+                <a:alpha val="35000"/>
+              </a:srgbClr>
+            </a:outerShdw>
+          </a:effectLst>
+        </a:effectStyle>
+        <a:effectStyle>
+          <a:effectLst>
+            <a:outerShdw blurRad="40000" dist="23000" dir="5400000" rotWithShape="0">
+              <a:srgbClr val="000000">
+                <a:alpha val="35000"/>
+              </a:srgbClr>
+            </a:outerShdw>
+          </a:effectLst>
+          <a:scene3d>
+            <a:camera prst="orthographicFront">
+              <a:rot lat="0" lon="0" rev="0"/>
+            </a:camera>
+            <a:lightRig rig="threePt" dir="t">
+              <a:rot lat="0" lon="0" rev="1200000"/>
+            </a:lightRig>
+          </a:scene3d>
+          <a:sp3d>
+            <a:bevelT w="63500" h="25400"/>
+          </a:sp3d>
+        </a:effectStyle>
+      </a:effectStyleLst>
+      <a:bgFillStyleLst>
+        <a:solidFill>
+          <a:schemeClr val="phClr"/>
+        </a:solidFill>
+        <a:gradFill rotWithShape="1">
+          <a:gsLst>
+            <a:gs pos="0">
+              <a:schemeClr val="phClr">
+                <a:tint val="40000"/>
+                <a:satMod val="350000"/>
+              </a:schemeClr>
+            </a:gs>
+            <a:gs pos="40000">
+              <a:schemeClr val="phClr">
+                <a:tint val="45000"/>
+                <a:shade val="99000"/>
+                <a:satMod val="350000"/>
+              </a:schemeClr>
+            </a:gs>
+            <a:gs pos="100000">
+              <a:schemeClr val="phClr">
+                <a:shade val="20000"/>
+                <a:satMod val="255000"/>
+              </a:schemeClr>
+            </a:gs>
+          </a:gsLst>
+          <a:path path="circle">
+            <a:fillToRect l="50000" t="-80000" r="50000" b="180000"/>
+          </a:path>
+        </a:gradFill>
+        <a:gradFill rotWithShape="1">
+          <a:gsLst>
+            <a:gs pos="0">
+              <a:schemeClr val="phClr">
+                <a:tint val="80000"/>
+                <a:satMod val="300000"/>
+              </a:schemeClr>
+            </a:gs>
+            <a:gs pos="100000">
+              <a:schemeClr val="phClr">
+                <a:shade val="30000"/>
+                <a:satMod val="200000"/>
+              </a:schemeClr>
+            </a:gs>
+          </a:gsLst>
+          <a:path path="circle">
+            <a:fillToRect l="50000" t="50000" r="50000" b="50000"/>
+          </a:path>
+        </a:gradFill>
+      </a:bgFillStyleLst>
+    </a:fmtScheme>
+  </a:themeElements>
+</a:theme>
+</file>
+
+<file path=ppt/theme/theme2.xml><?xml version="1.0" encoding="utf-8"?>
 <a:theme xmlns:a="http://schemas.openxmlformats.org/drawingml/2006/main" xmlns:r="http://schemas.openxmlformats.org/officeDocument/2006/relationships">
   <a:themeElements>
     <a:clrScheme name="Default">
@@ -34552,283 +34846,4 @@
     </a:fmtScheme>
   </a:themeElements>
 </a:theme>
-</file>
-
-<file path=ppt/theme/theme2.xml><?xml version="1.0" encoding="utf-8"?>
-<a:theme xmlns:a="http://schemas.openxmlformats.org/drawingml/2006/main" xmlns:r="http://schemas.openxmlformats.org/officeDocument/2006/relationships" name="Forensic Science Thesis Defense by Slidesgo">
-  <a:themeElements>
-    <a:clrScheme name="Simple Light">
-      <a:dk1>
-        <a:srgbClr val="F6CA8C"/>
-      </a:dk1>
-      <a:lt1>
-        <a:srgbClr val="020202"/>
-      </a:lt1>
-      <a:dk2>
-        <a:srgbClr val="F2F3ED"/>
-      </a:dk2>
-      <a:lt2>
-        <a:srgbClr val="DDAC67"/>
-      </a:lt2>
-      <a:accent1>
-        <a:srgbClr val="FDE2BD"/>
-      </a:accent1>
-      <a:accent2>
-        <a:srgbClr val="FFFFFF"/>
-      </a:accent2>
-      <a:accent3>
-        <a:srgbClr val="FFFFFF"/>
-      </a:accent3>
-      <a:accent4>
-        <a:srgbClr val="FFFFFF"/>
-      </a:accent4>
-      <a:accent5>
-        <a:srgbClr val="FFFFFF"/>
-      </a:accent5>
-      <a:accent6>
-        <a:srgbClr val="FFFFFF"/>
-      </a:accent6>
-      <a:hlink>
-        <a:srgbClr val="F2F3ED"/>
-      </a:hlink>
-      <a:folHlink>
-        <a:srgbClr val="0097A7"/>
-      </a:folHlink>
-    </a:clrScheme>
-    <a:fontScheme name="Office">
-      <a:majorFont>
-        <a:latin typeface="Arial"/>
-        <a:ea typeface=""/>
-        <a:cs typeface=""/>
-        <a:font script="Jpan" typeface="ＭＳ Ｐゴシック"/>
-        <a:font script="Hang" typeface="맑은 고딕"/>
-        <a:font script="Hans" typeface="宋体"/>
-        <a:font script="Hant" typeface="新細明體"/>
-        <a:font script="Arab" typeface="Times New Roman"/>
-        <a:font script="Hebr" typeface="Times New Roman"/>
-        <a:font script="Thai" typeface="Angsana New"/>
-        <a:font script="Ethi" typeface="Nyala"/>
-        <a:font script="Beng" typeface="Vrinda"/>
-        <a:font script="Gujr" typeface="Shruti"/>
-        <a:font script="Khmr" typeface="MoolBoran"/>
-        <a:font script="Knda" typeface="Tunga"/>
-        <a:font script="Guru" typeface="Raavi"/>
-        <a:font script="Cans" typeface="Euphemia"/>
-        <a:font script="Cher" typeface="Plantagenet Cherokee"/>
-        <a:font script="Yiii" typeface="Microsoft Yi Baiti"/>
-        <a:font script="Tibt" typeface="Microsoft Himalaya"/>
-        <a:font script="Thaa" typeface="MV Boli"/>
-        <a:font script="Deva" typeface="Mangal"/>
-        <a:font script="Telu" typeface="Gautami"/>
-        <a:font script="Taml" typeface="Latha"/>
-        <a:font script="Syrc" typeface="Estrangelo Edessa"/>
-        <a:font script="Orya" typeface="Kalinga"/>
-        <a:font script="Mlym" typeface="Kartika"/>
-        <a:font script="Laoo" typeface="DokChampa"/>
-        <a:font script="Sinh" typeface="Iskoola Pota"/>
-        <a:font script="Mong" typeface="Mongolian Baiti"/>
-        <a:font script="Viet" typeface="Times New Roman"/>
-        <a:font script="Uigh" typeface="Microsoft Uighur"/>
-        <a:font script="Geor" typeface="Sylfaen"/>
-      </a:majorFont>
-      <a:minorFont>
-        <a:latin typeface="Arial"/>
-        <a:ea typeface=""/>
-        <a:cs typeface=""/>
-        <a:font script="Jpan" typeface="ＭＳ Ｐゴシック"/>
-        <a:font script="Hang" typeface="맑은 고딕"/>
-        <a:font script="Hans" typeface="宋体"/>
-        <a:font script="Hant" typeface="新細明體"/>
-        <a:font script="Arab" typeface="Arial"/>
-        <a:font script="Hebr" typeface="Arial"/>
-        <a:font script="Thai" typeface="Cordia New"/>
-        <a:font script="Ethi" typeface="Nyala"/>
-        <a:font script="Beng" typeface="Vrinda"/>
-        <a:font script="Gujr" typeface="Shruti"/>
-        <a:font script="Khmr" typeface="DaunPenh"/>
-        <a:font script="Knda" typeface="Tunga"/>
-        <a:font script="Guru" typeface="Raavi"/>
-        <a:font script="Cans" typeface="Euphemia"/>
-        <a:font script="Cher" typeface="Plantagenet Cherokee"/>
-        <a:font script="Yiii" typeface="Microsoft Yi Baiti"/>
-        <a:font script="Tibt" typeface="Microsoft Himalaya"/>
-        <a:font script="Thaa" typeface="MV Boli"/>
-        <a:font script="Deva" typeface="Mangal"/>
-        <a:font script="Telu" typeface="Gautami"/>
-        <a:font script="Taml" typeface="Latha"/>
-        <a:font script="Syrc" typeface="Estrangelo Edessa"/>
-        <a:font script="Orya" typeface="Kalinga"/>
-        <a:font script="Mlym" typeface="Kartika"/>
-        <a:font script="Laoo" typeface="DokChampa"/>
-        <a:font script="Sinh" typeface="Iskoola Pota"/>
-        <a:font script="Mong" typeface="Mongolian Baiti"/>
-        <a:font script="Viet" typeface="Arial"/>
-        <a:font script="Uigh" typeface="Microsoft Uighur"/>
-        <a:font script="Geor" typeface="Sylfaen"/>
-      </a:minorFont>
-    </a:fontScheme>
-    <a:fmtScheme name="Office">
-      <a:fillStyleLst>
-        <a:solidFill>
-          <a:schemeClr val="phClr"/>
-        </a:solidFill>
-        <a:gradFill rotWithShape="1">
-          <a:gsLst>
-            <a:gs pos="0">
-              <a:schemeClr val="phClr">
-                <a:tint val="50000"/>
-                <a:satMod val="300000"/>
-              </a:schemeClr>
-            </a:gs>
-            <a:gs pos="35000">
-              <a:schemeClr val="phClr">
-                <a:tint val="37000"/>
-                <a:satMod val="300000"/>
-              </a:schemeClr>
-            </a:gs>
-            <a:gs pos="100000">
-              <a:schemeClr val="phClr">
-                <a:tint val="15000"/>
-                <a:satMod val="350000"/>
-              </a:schemeClr>
-            </a:gs>
-          </a:gsLst>
-          <a:lin ang="16200000" scaled="1"/>
-        </a:gradFill>
-        <a:gradFill rotWithShape="1">
-          <a:gsLst>
-            <a:gs pos="0">
-              <a:schemeClr val="phClr">
-                <a:tint val="100000"/>
-                <a:shade val="100000"/>
-                <a:satMod val="130000"/>
-              </a:schemeClr>
-            </a:gs>
-            <a:gs pos="100000">
-              <a:schemeClr val="phClr">
-                <a:tint val="50000"/>
-                <a:shade val="100000"/>
-                <a:satMod val="350000"/>
-              </a:schemeClr>
-            </a:gs>
-          </a:gsLst>
-          <a:lin ang="16200000" scaled="0"/>
-        </a:gradFill>
-      </a:fillStyleLst>
-      <a:lnStyleLst>
-        <a:ln w="9525" cap="flat" cmpd="sng" algn="ctr">
-          <a:solidFill>
-            <a:schemeClr val="phClr">
-              <a:shade val="95000"/>
-              <a:satMod val="105000"/>
-            </a:schemeClr>
-          </a:solidFill>
-          <a:prstDash val="solid"/>
-        </a:ln>
-        <a:ln w="25400" cap="flat" cmpd="sng" algn="ctr">
-          <a:solidFill>
-            <a:schemeClr val="phClr"/>
-          </a:solidFill>
-          <a:prstDash val="solid"/>
-        </a:ln>
-        <a:ln w="38100" cap="flat" cmpd="sng" algn="ctr">
-          <a:solidFill>
-            <a:schemeClr val="phClr"/>
-          </a:solidFill>
-          <a:prstDash val="solid"/>
-        </a:ln>
-      </a:lnStyleLst>
-      <a:effectStyleLst>
-        <a:effectStyle>
-          <a:effectLst>
-            <a:outerShdw blurRad="40000" dist="20000" dir="5400000" rotWithShape="0">
-              <a:srgbClr val="000000">
-                <a:alpha val="38000"/>
-              </a:srgbClr>
-            </a:outerShdw>
-          </a:effectLst>
-        </a:effectStyle>
-        <a:effectStyle>
-          <a:effectLst>
-            <a:outerShdw blurRad="40000" dist="23000" dir="5400000" rotWithShape="0">
-              <a:srgbClr val="000000">
-                <a:alpha val="35000"/>
-              </a:srgbClr>
-            </a:outerShdw>
-          </a:effectLst>
-        </a:effectStyle>
-        <a:effectStyle>
-          <a:effectLst>
-            <a:outerShdw blurRad="40000" dist="23000" dir="5400000" rotWithShape="0">
-              <a:srgbClr val="000000">
-                <a:alpha val="35000"/>
-              </a:srgbClr>
-            </a:outerShdw>
-          </a:effectLst>
-          <a:scene3d>
-            <a:camera prst="orthographicFront">
-              <a:rot lat="0" lon="0" rev="0"/>
-            </a:camera>
-            <a:lightRig rig="threePt" dir="t">
-              <a:rot lat="0" lon="0" rev="1200000"/>
-            </a:lightRig>
-          </a:scene3d>
-          <a:sp3d>
-            <a:bevelT w="63500" h="25400"/>
-          </a:sp3d>
-        </a:effectStyle>
-      </a:effectStyleLst>
-      <a:bgFillStyleLst>
-        <a:solidFill>
-          <a:schemeClr val="phClr"/>
-        </a:solidFill>
-        <a:gradFill rotWithShape="1">
-          <a:gsLst>
-            <a:gs pos="0">
-              <a:schemeClr val="phClr">
-                <a:tint val="40000"/>
-                <a:satMod val="350000"/>
-              </a:schemeClr>
-            </a:gs>
-            <a:gs pos="40000">
-              <a:schemeClr val="phClr">
-                <a:tint val="45000"/>
-                <a:shade val="99000"/>
-                <a:satMod val="350000"/>
-              </a:schemeClr>
-            </a:gs>
-            <a:gs pos="100000">
-              <a:schemeClr val="phClr">
-                <a:shade val="20000"/>
-                <a:satMod val="255000"/>
-              </a:schemeClr>
-            </a:gs>
-          </a:gsLst>
-          <a:path path="circle">
-            <a:fillToRect l="50000" t="-80000" r="50000" b="180000"/>
-          </a:path>
-        </a:gradFill>
-        <a:gradFill rotWithShape="1">
-          <a:gsLst>
-            <a:gs pos="0">
-              <a:schemeClr val="phClr">
-                <a:tint val="80000"/>
-                <a:satMod val="300000"/>
-              </a:schemeClr>
-            </a:gs>
-            <a:gs pos="100000">
-              <a:schemeClr val="phClr">
-                <a:shade val="30000"/>
-                <a:satMod val="200000"/>
-              </a:schemeClr>
-            </a:gs>
-          </a:gsLst>
-          <a:path path="circle">
-            <a:fillToRect l="50000" t="50000" r="50000" b="50000"/>
-          </a:path>
-        </a:gradFill>
-      </a:bgFillStyleLst>
-    </a:fmtScheme>
-  </a:themeElements>
-</a:theme>
 </file>
</xml_diff>